<commit_message>
Added Procfile for heroku
</commit_message>
<xml_diff>
--- a/others/GradeIt presentation final.pptx
+++ b/others/GradeIt presentation final.pptx
@@ -451,6 +451,30 @@
             <pc:docMk/>
             <pc:sldMk cId="0" sldId="264"/>
             <ac:spMk id="107" creationId="{00000000-0000-0000-0000-000000000000}"/>
+          </ac:spMkLst>
+        </pc:spChg>
+      </pc:sldChg>
+    </pc:docChg>
+  </pc:docChgLst>
+  <pc:docChgLst>
+    <pc:chgData name="Jose Urdaneta" userId="452e9f5b8ecac074" providerId="LiveId" clId="{6BE123D7-0F26-4BFB-ABBB-E03DFE7E4035}"/>
+    <pc:docChg chg="modSld">
+      <pc:chgData name="Jose Urdaneta" userId="452e9f5b8ecac074" providerId="LiveId" clId="{6BE123D7-0F26-4BFB-ABBB-E03DFE7E4035}" dt="2019-02-28T00:08:08.490" v="19" actId="20577"/>
+      <pc:docMkLst>
+        <pc:docMk/>
+      </pc:docMkLst>
+      <pc:sldChg chg="modSp">
+        <pc:chgData name="Jose Urdaneta" userId="452e9f5b8ecac074" providerId="LiveId" clId="{6BE123D7-0F26-4BFB-ABBB-E03DFE7E4035}" dt="2019-02-28T00:08:08.490" v="19" actId="20577"/>
+        <pc:sldMkLst>
+          <pc:docMk/>
+          <pc:sldMk cId="0" sldId="256"/>
+        </pc:sldMkLst>
+        <pc:spChg chg="mod">
+          <ac:chgData name="Jose Urdaneta" userId="452e9f5b8ecac074" providerId="LiveId" clId="{6BE123D7-0F26-4BFB-ABBB-E03DFE7E4035}" dt="2019-02-28T00:08:08.490" v="19" actId="20577"/>
+          <ac:spMkLst>
+            <pc:docMk/>
+            <pc:sldMk cId="0" sldId="256"/>
+            <ac:spMk id="60" creationId="{00000000-0000-0000-0000-000000000000}"/>
           </ac:spMkLst>
         </pc:spChg>
       </pc:sldChg>
@@ -5841,7 +5865,7 @@
             <a:pPr lvl="0"/>
             <a:r>
               <a:rPr lang="en-US" dirty="0"/>
-              <a:t>https://github.com/urdans</a:t>
+              <a:t>@urdans</a:t>
             </a:r>
             <a:endParaRPr lang="en" dirty="0"/>
           </a:p>

</xml_diff>